<commit_message>
Add READMEs for each app
</commit_message>
<xml_diff>
--- a/search-analytics/images/search-analytics-architecture.pptx
+++ b/search-analytics/images/search-analytics-architecture.pptx
@@ -104,6 +104,11 @@
       </a:defRPr>
     </a:lvl9pPr>
   </p:defaultTextStyle>
+  <p:extLst>
+    <p:ext uri="{EFAFB233-063F-42B5-8137-9DF3F51BA10A}">
+      <p15:sldGuideLst xmlns:p15="http://schemas.microsoft.com/office/powerpoint/2012/main"/>
+    </p:ext>
+  </p:extLst>
 </p:presentation>
 </file>
 
@@ -3480,7 +3485,7 @@
         </p:nvCxnSpPr>
         <p:spPr>
           <a:xfrm>
-            <a:off x="2554772" y="3165907"/>
+            <a:off x="2554772" y="2516548"/>
             <a:ext cx="1395277" cy="0"/>
           </a:xfrm>
           <a:prstGeom prst="straightConnector1">
@@ -3523,7 +3528,7 @@
         </p:nvSpPr>
         <p:spPr>
           <a:xfrm>
-            <a:off x="2554772" y="3202597"/>
+            <a:off x="2554772" y="2553238"/>
             <a:ext cx="1072750" cy="430887"/>
           </a:xfrm>
           <a:prstGeom prst="rect">
@@ -3565,7 +3570,7 @@
         </p:nvCxnSpPr>
         <p:spPr>
           <a:xfrm>
-            <a:off x="4967856" y="3208771"/>
+            <a:off x="4967856" y="2559412"/>
             <a:ext cx="878721" cy="0"/>
           </a:xfrm>
           <a:prstGeom prst="straightConnector1">
@@ -3622,7 +3627,7 @@
         </p:blipFill>
         <p:spPr>
           <a:xfrm>
-            <a:off x="6155423" y="2780640"/>
+            <a:off x="6155423" y="2131281"/>
             <a:ext cx="684033" cy="855041"/>
           </a:xfrm>
           <a:prstGeom prst="rect">
@@ -3644,7 +3649,7 @@
         </p:nvGrpSpPr>
         <p:grpSpPr>
           <a:xfrm>
-            <a:off x="1171325" y="2855021"/>
+            <a:off x="1171325" y="2205662"/>
             <a:ext cx="1425091" cy="930584"/>
             <a:chOff x="790507" y="2855021"/>
             <a:chExt cx="1425091" cy="930584"/>
@@ -3741,7 +3746,7 @@
         </p:nvGrpSpPr>
         <p:grpSpPr>
           <a:xfrm>
-            <a:off x="3714107" y="2865387"/>
+            <a:off x="3714107" y="2216028"/>
             <a:ext cx="1425091" cy="927269"/>
             <a:chOff x="3219047" y="1618114"/>
             <a:chExt cx="1425091" cy="927269"/>
@@ -3852,7 +3857,7 @@
         </p:blipFill>
         <p:spPr>
           <a:xfrm>
-            <a:off x="7968690" y="2631282"/>
+            <a:off x="7968690" y="1981923"/>
             <a:ext cx="762000" cy="1231900"/>
           </a:xfrm>
           <a:prstGeom prst="rect">
@@ -3876,7 +3881,7 @@
         </p:nvCxnSpPr>
         <p:spPr>
           <a:xfrm>
-            <a:off x="6957987" y="3208503"/>
+            <a:off x="6957987" y="2559144"/>
             <a:ext cx="878721" cy="0"/>
           </a:xfrm>
           <a:prstGeom prst="straightConnector1">
@@ -3921,7 +3926,7 @@
         </p:nvCxnSpPr>
         <p:spPr>
           <a:xfrm>
-            <a:off x="8871453" y="3208506"/>
+            <a:off x="8871453" y="2559147"/>
             <a:ext cx="853318" cy="0"/>
           </a:xfrm>
           <a:prstGeom prst="straightConnector1">
@@ -3964,8 +3969,8 @@
         </p:nvSpPr>
         <p:spPr>
           <a:xfrm>
-            <a:off x="3714108" y="2133610"/>
-            <a:ext cx="5578177" cy="2336790"/>
+            <a:off x="3714108" y="1484250"/>
+            <a:ext cx="5578177" cy="3551573"/>
           </a:xfrm>
           <a:prstGeom prst="rect">
             <a:avLst/>
@@ -4051,7 +4056,7 @@
         </p:blipFill>
         <p:spPr>
           <a:xfrm>
-            <a:off x="9948973" y="2631282"/>
+            <a:off x="9948973" y="1981923"/>
             <a:ext cx="762000" cy="1231900"/>
           </a:xfrm>
           <a:prstGeom prst="rect">
@@ -4059,6 +4064,188 @@
           </a:prstGeom>
         </p:spPr>
       </p:pic>
+      <p:grpSp>
+        <p:nvGrpSpPr>
+          <p:cNvPr id="17" name="Group 16">
+            <a:extLst>
+              <a:ext uri="{FF2B5EF4-FFF2-40B4-BE49-F238E27FC236}">
+                <a16:creationId xmlns:a16="http://schemas.microsoft.com/office/drawing/2014/main" id="{4F4CF254-7EB5-EC4F-9CD1-8C5CC03103C0}"/>
+              </a:ext>
+            </a:extLst>
+          </p:cNvPr>
+          <p:cNvGrpSpPr/>
+          <p:nvPr/>
+        </p:nvGrpSpPr>
+        <p:grpSpPr>
+          <a:xfrm>
+            <a:off x="7836708" y="3698936"/>
+            <a:ext cx="1072750" cy="1047357"/>
+            <a:chOff x="255233" y="3486651"/>
+            <a:chExt cx="1072750" cy="1047357"/>
+          </a:xfrm>
+        </p:grpSpPr>
+        <p:pic>
+          <p:nvPicPr>
+            <p:cNvPr id="18" name="Graphic 17">
+              <a:extLst>
+                <a:ext uri="{FF2B5EF4-FFF2-40B4-BE49-F238E27FC236}">
+                  <a16:creationId xmlns:a16="http://schemas.microsoft.com/office/drawing/2014/main" id="{F951886C-6FBF-F44C-806A-679155E5EA6C}"/>
+                </a:ext>
+              </a:extLst>
+            </p:cNvPr>
+            <p:cNvPicPr>
+              <a:picLocks noChangeAspect="1"/>
+            </p:cNvPicPr>
+            <p:nvPr/>
+          </p:nvPicPr>
+          <p:blipFill>
+            <a:blip r:embed="rId12">
+              <a:extLst>
+                <a:ext uri="{96DAC541-7B7A-43D3-8B79-37D633B846F1}">
+                  <asvg:svgBlip xmlns:asvg="http://schemas.microsoft.com/office/drawing/2016/SVG/main" r:embed="rId13"/>
+                </a:ext>
+              </a:extLst>
+            </a:blip>
+            <a:stretch>
+              <a:fillRect/>
+            </a:stretch>
+          </p:blipFill>
+          <p:spPr>
+            <a:xfrm>
+              <a:off x="505858" y="3486651"/>
+              <a:ext cx="571500" cy="571500"/>
+            </a:xfrm>
+            <a:prstGeom prst="rect">
+              <a:avLst/>
+            </a:prstGeom>
+          </p:spPr>
+        </p:pic>
+        <p:sp>
+          <p:nvSpPr>
+            <p:cNvPr id="19" name="TextBox 18">
+              <a:extLst>
+                <a:ext uri="{FF2B5EF4-FFF2-40B4-BE49-F238E27FC236}">
+                  <a16:creationId xmlns:a16="http://schemas.microsoft.com/office/drawing/2014/main" id="{B79B74D9-41A9-5541-8D89-B8B7249E609E}"/>
+                </a:ext>
+              </a:extLst>
+            </p:cNvPr>
+            <p:cNvSpPr txBox="1"/>
+            <p:nvPr/>
+          </p:nvSpPr>
+          <p:spPr>
+            <a:xfrm>
+              <a:off x="255233" y="4103121"/>
+              <a:ext cx="1072750" cy="430887"/>
+            </a:xfrm>
+            <a:prstGeom prst="rect">
+              <a:avLst/>
+            </a:prstGeom>
+            <a:noFill/>
+          </p:spPr>
+          <p:txBody>
+            <a:bodyPr wrap="square" rtlCol="0">
+              <a:spAutoFit/>
+            </a:bodyPr>
+            <a:lstStyle/>
+            <a:p>
+              <a:pPr algn="ctr"/>
+              <a:r>
+                <a:rPr lang="en-US" sz="1100" dirty="0">
+                  <a:solidFill>
+                    <a:schemeClr val="bg1"/>
+                  </a:solidFill>
+                </a:rPr>
+                <a:t>Amazon S3 backup bucket</a:t>
+              </a:r>
+            </a:p>
+          </p:txBody>
+        </p:sp>
+      </p:grpSp>
+      <p:cxnSp>
+        <p:nvCxnSpPr>
+          <p:cNvPr id="20" name="Straight Arrow Connector 19">
+            <a:extLst>
+              <a:ext uri="{FF2B5EF4-FFF2-40B4-BE49-F238E27FC236}">
+                <a16:creationId xmlns:a16="http://schemas.microsoft.com/office/drawing/2014/main" id="{21350F77-09F7-FD45-ACDA-07A714D2D27D}"/>
+              </a:ext>
+            </a:extLst>
+          </p:cNvPr>
+          <p:cNvCxnSpPr>
+            <a:cxnSpLocks/>
+          </p:cNvCxnSpPr>
+          <p:nvPr/>
+        </p:nvCxnSpPr>
+        <p:spPr>
+          <a:xfrm>
+            <a:off x="8335616" y="3253579"/>
+            <a:ext cx="0" cy="372642"/>
+          </a:xfrm>
+          <a:prstGeom prst="straightConnector1">
+            <a:avLst/>
+          </a:prstGeom>
+          <a:ln w="12700">
+            <a:solidFill>
+              <a:srgbClr val="E6ECEF"/>
+            </a:solidFill>
+            <a:headEnd type="none" w="med" len="sm"/>
+            <a:tailEnd type="arrow" w="med" len="sm"/>
+          </a:ln>
+        </p:spPr>
+        <p:style>
+          <a:lnRef idx="1">
+            <a:schemeClr val="accent1"/>
+          </a:lnRef>
+          <a:fillRef idx="0">
+            <a:schemeClr val="accent1"/>
+          </a:fillRef>
+          <a:effectRef idx="0">
+            <a:schemeClr val="accent1"/>
+          </a:effectRef>
+          <a:fontRef idx="minor">
+            <a:schemeClr val="tx1"/>
+          </a:fontRef>
+        </p:style>
+      </p:cxnSp>
+      <p:sp>
+        <p:nvSpPr>
+          <p:cNvPr id="23" name="TextBox 22">
+            <a:extLst>
+              <a:ext uri="{FF2B5EF4-FFF2-40B4-BE49-F238E27FC236}">
+                <a16:creationId xmlns:a16="http://schemas.microsoft.com/office/drawing/2014/main" id="{74D9A33C-F0A9-A540-8DA9-F02F8F4F39DD}"/>
+              </a:ext>
+            </a:extLst>
+          </p:cNvPr>
+          <p:cNvSpPr txBox="1"/>
+          <p:nvPr/>
+        </p:nvSpPr>
+        <p:spPr>
+          <a:xfrm>
+            <a:off x="7086783" y="3312389"/>
+            <a:ext cx="1425091" cy="261610"/>
+          </a:xfrm>
+          <a:prstGeom prst="rect">
+            <a:avLst/>
+          </a:prstGeom>
+          <a:noFill/>
+        </p:spPr>
+        <p:txBody>
+          <a:bodyPr wrap="square" rtlCol="0">
+            <a:spAutoFit/>
+          </a:bodyPr>
+          <a:lstStyle/>
+          <a:p>
+            <a:pPr algn="ctr"/>
+            <a:r>
+              <a:rPr lang="en-US" sz="1100" dirty="0">
+                <a:solidFill>
+                  <a:schemeClr val="bg1"/>
+                </a:solidFill>
+              </a:rPr>
+              <a:t>Failed messages</a:t>
+            </a:r>
+          </a:p>
+        </p:txBody>
+      </p:sp>
     </p:spTree>
     <p:extLst>
       <p:ext uri="{BB962C8B-B14F-4D97-AF65-F5344CB8AC3E}">

</xml_diff>